<commit_message>
更新PPT 06 07 08
</commit_message>
<xml_diff>
--- a/课程PPT/06.JavaScript对象（6、对象属性特性）.pptx
+++ b/课程PPT/06.JavaScript对象（6、对象属性特性）.pptx
@@ -10778,30 +10778,21 @@
                             </p:childTnLst>
                           </p:cTn>
                         </p:par>
-                      </p:childTnLst>
-                    </p:cTn>
-                  </p:par>
-                  <p:par>
-                    <p:cTn id="9" fill="hold">
-                      <p:stCondLst>
-                        <p:cond delay="indefinite"/>
-                      </p:stCondLst>
-                      <p:childTnLst>
                         <p:par>
-                          <p:cTn id="10" fill="hold">
+                          <p:cTn id="9" fill="hold">
                             <p:stCondLst>
-                              <p:cond delay="0"/>
+                              <p:cond delay="500"/>
                             </p:stCondLst>
                             <p:childTnLst>
                               <p:par>
-                                <p:cTn id="11" presetID="2" presetClass="entr" presetSubtype="4" fill="hold" nodeType="clickEffect">
+                                <p:cTn id="10" presetID="2" presetClass="entr" presetSubtype="4" fill="hold" nodeType="afterEffect">
                                   <p:stCondLst>
                                     <p:cond delay="0"/>
                                   </p:stCondLst>
                                   <p:childTnLst>
                                     <p:set>
                                       <p:cBhvr>
-                                        <p:cTn id="12" dur="1" fill="hold">
+                                        <p:cTn id="11" dur="1" fill="hold">
                                           <p:stCondLst>
                                             <p:cond delay="0"/>
                                           </p:stCondLst>
@@ -10819,7 +10810,7 @@
                                     </p:set>
                                     <p:anim calcmode="lin" valueType="num">
                                       <p:cBhvr additive="base">
-                                        <p:cTn id="13" dur="500" fill="hold"/>
+                                        <p:cTn id="12" dur="500" fill="hold"/>
                                         <p:tgtEl>
                                           <p:spTgt spid="5"/>
                                         </p:tgtEl>
@@ -10842,7 +10833,7 @@
                                     </p:anim>
                                     <p:anim calcmode="lin" valueType="num">
                                       <p:cBhvr additive="base">
-                                        <p:cTn id="14" dur="500" fill="hold"/>
+                                        <p:cTn id="13" dur="500" fill="hold"/>
                                         <p:tgtEl>
                                           <p:spTgt spid="5"/>
                                         </p:tgtEl>
@@ -10869,14 +10860,23 @@
                             </p:childTnLst>
                           </p:cTn>
                         </p:par>
+                      </p:childTnLst>
+                    </p:cTn>
+                  </p:par>
+                  <p:par>
+                    <p:cTn id="14" fill="hold">
+                      <p:stCondLst>
+                        <p:cond delay="indefinite"/>
+                      </p:stCondLst>
+                      <p:childTnLst>
                         <p:par>
                           <p:cTn id="15" fill="hold">
                             <p:stCondLst>
-                              <p:cond delay="500"/>
+                              <p:cond delay="0"/>
                             </p:stCondLst>
                             <p:childTnLst>
                               <p:par>
-                                <p:cTn id="16" presetID="2" presetClass="entr" presetSubtype="4" fill="hold" nodeType="afterEffect">
+                                <p:cTn id="16" presetID="2" presetClass="entr" presetSubtype="4" fill="hold" nodeType="clickEffect">
                                   <p:stCondLst>
                                     <p:cond delay="0"/>
                                   </p:stCondLst>
@@ -10954,7 +10954,7 @@
                         <p:par>
                           <p:cTn id="20" fill="hold">
                             <p:stCondLst>
-                              <p:cond delay="1000"/>
+                              <p:cond delay="500"/>
                             </p:stCondLst>
                             <p:childTnLst>
                               <p:par>
@@ -11299,7 +11299,25 @@
               <a:rPr kumimoji="0" lang="zh-CN" altLang="en-US" dirty="0">
                 <a:sym typeface="+mn-ea"/>
               </a:rPr>
-              <a:t>给对象添加属性（直接添加）</a:t>
+              <a:t>给对象添加属性（方式</a:t>
+            </a:r>
+            <a:r>
+              <a:rPr kumimoji="0" lang="en-US" altLang="zh-CN" dirty="0">
+                <a:sym typeface="+mn-ea"/>
+              </a:rPr>
+              <a:t>1</a:t>
+            </a:r>
+            <a:r>
+              <a:rPr kumimoji="0" lang="zh-CN" altLang="en-US" dirty="0">
+                <a:sym typeface="+mn-ea"/>
+              </a:rPr>
+              <a:t>：</a:t>
+            </a:r>
+            <a:r>
+              <a:rPr kumimoji="0" lang="zh-CN" altLang="en-US" dirty="0">
+                <a:sym typeface="+mn-ea"/>
+              </a:rPr>
+              <a:t>直接添加）</a:t>
             </a:r>
             <a:endParaRPr kumimoji="0" lang="en-US" altLang="zh-CN" dirty="0">
               <a:sym typeface="+mn-ea"/>
@@ -12346,8 +12364,8 @@
         </p:nvSpPr>
         <p:spPr>
           <a:xfrm>
-            <a:off x="947420" y="308610"/>
-            <a:ext cx="10690225" cy="490220"/>
+            <a:off x="701040" y="308610"/>
+            <a:ext cx="11223625" cy="490220"/>
           </a:xfrm>
         </p:spPr>
         <p:txBody>
@@ -12362,19 +12380,37 @@
               <a:rPr kumimoji="0" lang="zh-CN" altLang="en-US" dirty="0">
                 <a:sym typeface="+mn-ea"/>
               </a:rPr>
-              <a:t>对象添加属性（通过</a:t>
+              <a:t>对象添加属性（方式</a:t>
             </a:r>
             <a:r>
               <a:rPr kumimoji="0" lang="en-US" altLang="zh-CN" dirty="0">
                 <a:sym typeface="+mn-ea"/>
               </a:rPr>
+              <a:t>2</a:t>
+            </a:r>
+            <a:r>
+              <a:rPr kumimoji="0" lang="zh-CN" altLang="en-US" dirty="0">
+                <a:sym typeface="+mn-ea"/>
+              </a:rPr>
+              <a:t>：</a:t>
+            </a:r>
+            <a:r>
+              <a:rPr kumimoji="0" lang="zh-CN" altLang="en-US" dirty="0">
+                <a:sym typeface="+mn-ea"/>
+              </a:rPr>
+              <a:t>通过</a:t>
+            </a:r>
+            <a:r>
+              <a:rPr kumimoji="0" lang="en-US" altLang="zh-CN" dirty="0">
+                <a:sym typeface="+mn-ea"/>
+              </a:rPr>
               <a:t>Object.defineProperty</a:t>
             </a:r>
             <a:r>
               <a:rPr kumimoji="0" lang="zh-CN" altLang="en-US" dirty="0">
                 <a:sym typeface="+mn-ea"/>
               </a:rPr>
-              <a:t>方法添加）</a:t>
+              <a:t>添加）</a:t>
             </a:r>
             <a:endParaRPr kumimoji="0" lang="en-US" altLang="zh-CN" dirty="0">
               <a:sym typeface="+mn-ea"/>
@@ -12435,18 +12471,7 @@
                 <a:ea typeface="+mn-ea"/>
                 <a:sym typeface="+mn-ea"/>
               </a:rPr>
-              <a:t>后</a:t>
-            </a:r>
-            <a:r>
-              <a:rPr lang="zh-CN" altLang="en-US" sz="2200">
-                <a:solidFill>
-                  <a:srgbClr val="FF0000"/>
-                </a:solidFill>
-                <a:latin typeface="+mn-ea"/>
-                <a:ea typeface="+mn-ea"/>
-                <a:sym typeface="+mn-ea"/>
-              </a:rPr>
-              <a:t>半部分</a:t>
+              <a:t>后半部分</a:t>
             </a:r>
             <a:r>
               <a:rPr lang="en-US" altLang="zh-CN" sz="2200">

</xml_diff>